<commit_message>
project presentation and code
</commit_message>
<xml_diff>
--- a/coding project/presentation.pptx
+++ b/coding project/presentation.pptx
@@ -5,7 +5,7 @@
     <p:sldMasterId id="2147483660" r:id="rId4"/>
   </p:sldMasterIdLst>
   <p:notesMasterIdLst>
-    <p:notesMasterId r:id="rId18"/>
+    <p:notesMasterId r:id="rId21"/>
   </p:notesMasterIdLst>
   <p:sldIdLst>
     <p:sldId id="257" r:id="rId5"/>
@@ -17,10 +17,13 @@
     <p:sldId id="260" r:id="rId11"/>
     <p:sldId id="266" r:id="rId12"/>
     <p:sldId id="265" r:id="rId13"/>
-    <p:sldId id="267" r:id="rId14"/>
+    <p:sldId id="274" r:id="rId14"/>
     <p:sldId id="270" r:id="rId15"/>
-    <p:sldId id="268" r:id="rId16"/>
-    <p:sldId id="269" r:id="rId17"/>
+    <p:sldId id="272" r:id="rId16"/>
+    <p:sldId id="268" r:id="rId17"/>
+    <p:sldId id="271" r:id="rId18"/>
+    <p:sldId id="269" r:id="rId19"/>
+    <p:sldId id="273" r:id="rId20"/>
   </p:sldIdLst>
   <p:sldSz cx="12192000" cy="6858000"/>
   <p:notesSz cx="6858000" cy="9144000"/>
@@ -5110,6 +5113,54 @@
           </a:p>
         </p:txBody>
       </p:sp>
+      <p:pic>
+        <p:nvPicPr>
+          <p:cNvPr id="7" name="Picture 6"/>
+          <p:cNvPicPr>
+            <a:picLocks noChangeAspect="1"/>
+          </p:cNvPicPr>
+          <p:nvPr/>
+        </p:nvPicPr>
+        <p:blipFill>
+          <a:blip r:embed="rId2"/>
+          <a:stretch>
+            <a:fillRect/>
+          </a:stretch>
+        </p:blipFill>
+        <p:spPr>
+          <a:xfrm>
+            <a:off x="288986" y="2169975"/>
+            <a:ext cx="3198977" cy="2938990"/>
+          </a:xfrm>
+          <a:prstGeom prst="rect">
+            <a:avLst/>
+          </a:prstGeom>
+        </p:spPr>
+      </p:pic>
+      <p:pic>
+        <p:nvPicPr>
+          <p:cNvPr id="10" name="Picture 9"/>
+          <p:cNvPicPr>
+            <a:picLocks noChangeAspect="1"/>
+          </p:cNvPicPr>
+          <p:nvPr/>
+        </p:nvPicPr>
+        <p:blipFill>
+          <a:blip r:embed="rId3"/>
+          <a:stretch>
+            <a:fillRect/>
+          </a:stretch>
+        </p:blipFill>
+        <p:spPr>
+          <a:xfrm>
+            <a:off x="6564243" y="2169975"/>
+            <a:ext cx="3198977" cy="2938990"/>
+          </a:xfrm>
+          <a:prstGeom prst="rect">
+            <a:avLst/>
+          </a:prstGeom>
+        </p:spPr>
+      </p:pic>
       <p:sp>
         <p:nvSpPr>
           <p:cNvPr id="11" name="TextBox 10"/>
@@ -5134,19 +5185,33 @@
           <a:p>
             <a:r>
               <a:rPr lang="en-PH" dirty="0" smtClean="0"/>
-              <a:t>Accuracy: 75.76%</a:t>
-            </a:r>
-          </a:p>
-          <a:p>
+              <a:t>Accuracy: </a:t>
+            </a:r>
             <a:r>
               <a:rPr lang="en-PH" dirty="0" smtClean="0"/>
-              <a:t>Sensitivity: 59.21%</a:t>
-            </a:r>
+              <a:t>75.76%</a:t>
+            </a:r>
+            <a:endParaRPr lang="en-PH" dirty="0" smtClean="0"/>
           </a:p>
           <a:p>
             <a:r>
               <a:rPr lang="en-PH" dirty="0" smtClean="0"/>
-              <a:t>Specificity: 83.87%</a:t>
+              <a:t>Sensitivity: </a:t>
+            </a:r>
+            <a:r>
+              <a:rPr lang="en-PH" dirty="0" smtClean="0"/>
+              <a:t>59.21%</a:t>
+            </a:r>
+            <a:endParaRPr lang="en-PH" dirty="0" smtClean="0"/>
+          </a:p>
+          <a:p>
+            <a:r>
+              <a:rPr lang="en-PH" dirty="0" smtClean="0"/>
+              <a:t>Specificity: </a:t>
+            </a:r>
+            <a:r>
+              <a:rPr lang="en-PH" dirty="0" smtClean="0"/>
+              <a:t>83.87%</a:t>
             </a:r>
             <a:endParaRPr lang="en-PH" dirty="0"/>
           </a:p>
@@ -5176,19 +5241,33 @@
           <a:p>
             <a:r>
               <a:rPr lang="en-PH" dirty="0" smtClean="0"/>
-              <a:t>Accuracy: 76.19%</a:t>
-            </a:r>
-          </a:p>
-          <a:p>
+              <a:t>Accuracy: </a:t>
+            </a:r>
             <a:r>
               <a:rPr lang="en-PH" dirty="0" smtClean="0"/>
-              <a:t>Sensitivity: 61.84%</a:t>
-            </a:r>
+              <a:t>76.19%</a:t>
+            </a:r>
+            <a:endParaRPr lang="en-PH" dirty="0" smtClean="0"/>
           </a:p>
           <a:p>
             <a:r>
               <a:rPr lang="en-PH" dirty="0" smtClean="0"/>
-              <a:t>Specificity: 83.23%</a:t>
+              <a:t>Sensitivity: </a:t>
+            </a:r>
+            <a:r>
+              <a:rPr lang="en-PH" dirty="0" smtClean="0"/>
+              <a:t>61.84%</a:t>
+            </a:r>
+            <a:endParaRPr lang="en-PH" dirty="0" smtClean="0"/>
+          </a:p>
+          <a:p>
+            <a:r>
+              <a:rPr lang="en-PH" dirty="0" smtClean="0"/>
+              <a:t>Specificity: </a:t>
+            </a:r>
+            <a:r>
+              <a:rPr lang="en-PH" dirty="0" smtClean="0"/>
+              <a:t>83.23%</a:t>
             </a:r>
             <a:endParaRPr lang="en-PH" dirty="0"/>
           </a:p>
@@ -5202,7 +5281,7 @@
         </p:nvSpPr>
         <p:spPr>
           <a:xfrm>
-            <a:off x="0" y="0"/>
+            <a:off x="5179933" y="2987736"/>
             <a:ext cx="1777042" cy="465050"/>
           </a:xfrm>
           <a:prstGeom prst="rect">
@@ -5238,58 +5317,10 @@
           </a:p>
         </p:txBody>
       </p:sp>
-      <p:pic>
-        <p:nvPicPr>
-          <p:cNvPr id="3" name="Picture 2"/>
-          <p:cNvPicPr>
-            <a:picLocks noChangeAspect="1"/>
-          </p:cNvPicPr>
-          <p:nvPr/>
-        </p:nvPicPr>
-        <p:blipFill>
-          <a:blip r:embed="rId2"/>
-          <a:stretch>
-            <a:fillRect/>
-          </a:stretch>
-        </p:blipFill>
-        <p:spPr>
-          <a:xfrm>
-            <a:off x="291431" y="2169975"/>
-            <a:ext cx="3198978" cy="2938990"/>
-          </a:xfrm>
-          <a:prstGeom prst="rect">
-            <a:avLst/>
-          </a:prstGeom>
-        </p:spPr>
-      </p:pic>
-      <p:pic>
-        <p:nvPicPr>
-          <p:cNvPr id="5" name="Picture 4"/>
-          <p:cNvPicPr>
-            <a:picLocks noChangeAspect="1"/>
-          </p:cNvPicPr>
-          <p:nvPr/>
-        </p:nvPicPr>
-        <p:blipFill>
-          <a:blip r:embed="rId3"/>
-          <a:stretch>
-            <a:fillRect/>
-          </a:stretch>
-        </p:blipFill>
-        <p:spPr>
-          <a:xfrm>
-            <a:off x="6564243" y="2169975"/>
-            <a:ext cx="3198978" cy="2938990"/>
-          </a:xfrm>
-          <a:prstGeom prst="rect">
-            <a:avLst/>
-          </a:prstGeom>
-        </p:spPr>
-      </p:pic>
     </p:spTree>
     <p:extLst>
       <p:ext uri="{BB962C8B-B14F-4D97-AF65-F5344CB8AC3E}">
-        <p14:creationId xmlns:p14="http://schemas.microsoft.com/office/powerpoint/2010/main" val="468404928"/>
+        <p14:creationId xmlns:p14="http://schemas.microsoft.com/office/powerpoint/2010/main" val="493073753"/>
       </p:ext>
     </p:extLst>
   </p:cSld>
@@ -5299,9 +5330,281 @@
   <p:timing>
     <p:tnLst>
       <p:par>
-        <p:cTn id="1" dur="indefinite" restart="never" nodeType="tmRoot"/>
+        <p:cTn id="1" dur="indefinite" restart="never" nodeType="tmRoot">
+          <p:childTnLst>
+            <p:seq concurrent="1" nextAc="seek">
+              <p:cTn id="2" dur="indefinite" nodeType="mainSeq">
+                <p:childTnLst>
+                  <p:par>
+                    <p:cTn id="3" fill="hold">
+                      <p:stCondLst>
+                        <p:cond delay="indefinite"/>
+                      </p:stCondLst>
+                      <p:childTnLst>
+                        <p:par>
+                          <p:cTn id="4" fill="hold">
+                            <p:stCondLst>
+                              <p:cond delay="0"/>
+                            </p:stCondLst>
+                            <p:childTnLst>
+                              <p:par>
+                                <p:cTn id="5" presetID="42" presetClass="path" presetSubtype="0" accel="50000" decel="50000" fill="hold" grpId="0" nodeType="clickEffect">
+                                  <p:stCondLst>
+                                    <p:cond delay="0"/>
+                                  </p:stCondLst>
+                                  <p:childTnLst>
+                                    <p:animMotion origin="layout" path="M 3.75E-6 -4.44444E-6 L -0.42487 -0.43958 " pathEditMode="relative" rAng="0" ptsTypes="AA">
+                                      <p:cBhvr>
+                                        <p:cTn id="6" dur="300" fill="hold"/>
+                                        <p:tgtEl>
+                                          <p:spTgt spid="13"/>
+                                        </p:tgtEl>
+                                        <p:attrNameLst>
+                                          <p:attrName>ppt_x</p:attrName>
+                                          <p:attrName>ppt_y</p:attrName>
+                                        </p:attrNameLst>
+                                      </p:cBhvr>
+                                      <p:rCtr x="-21250" y="-21991"/>
+                                    </p:animMotion>
+                                  </p:childTnLst>
+                                </p:cTn>
+                              </p:par>
+                              <p:par>
+                                <p:cTn id="7" presetID="10" presetClass="entr" presetSubtype="0" fill="hold" grpId="0" nodeType="withEffect">
+                                  <p:stCondLst>
+                                    <p:cond delay="0"/>
+                                  </p:stCondLst>
+                                  <p:childTnLst>
+                                    <p:set>
+                                      <p:cBhvr>
+                                        <p:cTn id="8" dur="1" fill="hold">
+                                          <p:stCondLst>
+                                            <p:cond delay="0"/>
+                                          </p:stCondLst>
+                                        </p:cTn>
+                                        <p:tgtEl>
+                                          <p:spTgt spid="11"/>
+                                        </p:tgtEl>
+                                        <p:attrNameLst>
+                                          <p:attrName>style.visibility</p:attrName>
+                                        </p:attrNameLst>
+                                      </p:cBhvr>
+                                      <p:to>
+                                        <p:strVal val="visible"/>
+                                      </p:to>
+                                    </p:set>
+                                    <p:animEffect transition="in" filter="fade">
+                                      <p:cBhvr>
+                                        <p:cTn id="9" dur="1000"/>
+                                        <p:tgtEl>
+                                          <p:spTgt spid="11"/>
+                                        </p:tgtEl>
+                                      </p:cBhvr>
+                                    </p:animEffect>
+                                  </p:childTnLst>
+                                </p:cTn>
+                              </p:par>
+                              <p:par>
+                                <p:cTn id="10" presetID="10" presetClass="entr" presetSubtype="0" fill="hold" nodeType="withEffect">
+                                  <p:stCondLst>
+                                    <p:cond delay="0"/>
+                                  </p:stCondLst>
+                                  <p:childTnLst>
+                                    <p:set>
+                                      <p:cBhvr>
+                                        <p:cTn id="11" dur="1" fill="hold">
+                                          <p:stCondLst>
+                                            <p:cond delay="0"/>
+                                          </p:stCondLst>
+                                        </p:cTn>
+                                        <p:tgtEl>
+                                          <p:spTgt spid="7"/>
+                                        </p:tgtEl>
+                                        <p:attrNameLst>
+                                          <p:attrName>style.visibility</p:attrName>
+                                        </p:attrNameLst>
+                                      </p:cBhvr>
+                                      <p:to>
+                                        <p:strVal val="visible"/>
+                                      </p:to>
+                                    </p:set>
+                                    <p:animEffect transition="in" filter="fade">
+                                      <p:cBhvr>
+                                        <p:cTn id="12" dur="1000"/>
+                                        <p:tgtEl>
+                                          <p:spTgt spid="7"/>
+                                        </p:tgtEl>
+                                      </p:cBhvr>
+                                    </p:animEffect>
+                                  </p:childTnLst>
+                                </p:cTn>
+                              </p:par>
+                              <p:par>
+                                <p:cTn id="13" presetID="10" presetClass="entr" presetSubtype="0" fill="hold" grpId="0" nodeType="withEffect">
+                                  <p:stCondLst>
+                                    <p:cond delay="0"/>
+                                  </p:stCondLst>
+                                  <p:childTnLst>
+                                    <p:set>
+                                      <p:cBhvr>
+                                        <p:cTn id="14" dur="1" fill="hold">
+                                          <p:stCondLst>
+                                            <p:cond delay="0"/>
+                                          </p:stCondLst>
+                                        </p:cTn>
+                                        <p:tgtEl>
+                                          <p:spTgt spid="2"/>
+                                        </p:tgtEl>
+                                        <p:attrNameLst>
+                                          <p:attrName>style.visibility</p:attrName>
+                                        </p:attrNameLst>
+                                      </p:cBhvr>
+                                      <p:to>
+                                        <p:strVal val="visible"/>
+                                      </p:to>
+                                    </p:set>
+                                    <p:animEffect transition="in" filter="fade">
+                                      <p:cBhvr>
+                                        <p:cTn id="15" dur="1000"/>
+                                        <p:tgtEl>
+                                          <p:spTgt spid="2"/>
+                                        </p:tgtEl>
+                                      </p:cBhvr>
+                                    </p:animEffect>
+                                  </p:childTnLst>
+                                </p:cTn>
+                              </p:par>
+                              <p:par>
+                                <p:cTn id="16" presetID="10" presetClass="entr" presetSubtype="0" fill="hold" grpId="0" nodeType="withEffect">
+                                  <p:stCondLst>
+                                    <p:cond delay="0"/>
+                                  </p:stCondLst>
+                                  <p:childTnLst>
+                                    <p:set>
+                                      <p:cBhvr>
+                                        <p:cTn id="17" dur="1" fill="hold">
+                                          <p:stCondLst>
+                                            <p:cond delay="0"/>
+                                          </p:stCondLst>
+                                        </p:cTn>
+                                        <p:tgtEl>
+                                          <p:spTgt spid="4"/>
+                                        </p:tgtEl>
+                                        <p:attrNameLst>
+                                          <p:attrName>style.visibility</p:attrName>
+                                        </p:attrNameLst>
+                                      </p:cBhvr>
+                                      <p:to>
+                                        <p:strVal val="visible"/>
+                                      </p:to>
+                                    </p:set>
+                                    <p:animEffect transition="in" filter="fade">
+                                      <p:cBhvr>
+                                        <p:cTn id="18" dur="1000"/>
+                                        <p:tgtEl>
+                                          <p:spTgt spid="4"/>
+                                        </p:tgtEl>
+                                      </p:cBhvr>
+                                    </p:animEffect>
+                                  </p:childTnLst>
+                                </p:cTn>
+                              </p:par>
+                              <p:par>
+                                <p:cTn id="19" presetID="10" presetClass="entr" presetSubtype="0" fill="hold" nodeType="withEffect">
+                                  <p:stCondLst>
+                                    <p:cond delay="0"/>
+                                  </p:stCondLst>
+                                  <p:childTnLst>
+                                    <p:set>
+                                      <p:cBhvr>
+                                        <p:cTn id="20" dur="1" fill="hold">
+                                          <p:stCondLst>
+                                            <p:cond delay="0"/>
+                                          </p:stCondLst>
+                                        </p:cTn>
+                                        <p:tgtEl>
+                                          <p:spTgt spid="10"/>
+                                        </p:tgtEl>
+                                        <p:attrNameLst>
+                                          <p:attrName>style.visibility</p:attrName>
+                                        </p:attrNameLst>
+                                      </p:cBhvr>
+                                      <p:to>
+                                        <p:strVal val="visible"/>
+                                      </p:to>
+                                    </p:set>
+                                    <p:animEffect transition="in" filter="fade">
+                                      <p:cBhvr>
+                                        <p:cTn id="21" dur="1000"/>
+                                        <p:tgtEl>
+                                          <p:spTgt spid="10"/>
+                                        </p:tgtEl>
+                                      </p:cBhvr>
+                                    </p:animEffect>
+                                  </p:childTnLst>
+                                </p:cTn>
+                              </p:par>
+                              <p:par>
+                                <p:cTn id="22" presetID="1" presetClass="entr" presetSubtype="0" fill="hold" grpId="0" nodeType="withEffect">
+                                  <p:stCondLst>
+                                    <p:cond delay="0"/>
+                                  </p:stCondLst>
+                                  <p:childTnLst>
+                                    <p:set>
+                                      <p:cBhvr>
+                                        <p:cTn id="23" dur="1" fill="hold">
+                                          <p:stCondLst>
+                                            <p:cond delay="999"/>
+                                          </p:stCondLst>
+                                        </p:cTn>
+                                        <p:tgtEl>
+                                          <p:spTgt spid="12"/>
+                                        </p:tgtEl>
+                                        <p:attrNameLst>
+                                          <p:attrName>style.visibility</p:attrName>
+                                        </p:attrNameLst>
+                                      </p:cBhvr>
+                                      <p:to>
+                                        <p:strVal val="visible"/>
+                                      </p:to>
+                                    </p:set>
+                                  </p:childTnLst>
+                                </p:cTn>
+                              </p:par>
+                            </p:childTnLst>
+                          </p:cTn>
+                        </p:par>
+                      </p:childTnLst>
+                    </p:cTn>
+                  </p:par>
+                </p:childTnLst>
+              </p:cTn>
+              <p:prevCondLst>
+                <p:cond evt="onPrev" delay="0">
+                  <p:tgtEl>
+                    <p:sldTgt/>
+                  </p:tgtEl>
+                </p:cond>
+              </p:prevCondLst>
+              <p:nextCondLst>
+                <p:cond evt="onNext" delay="0">
+                  <p:tgtEl>
+                    <p:sldTgt/>
+                  </p:tgtEl>
+                </p:cond>
+              </p:nextCondLst>
+            </p:seq>
+          </p:childTnLst>
+        </p:cTn>
       </p:par>
     </p:tnLst>
+    <p:bldLst>
+      <p:bldP spid="2" grpId="0" animBg="1"/>
+      <p:bldP spid="4" grpId="0" animBg="1"/>
+      <p:bldP spid="11" grpId="0"/>
+      <p:bldP spid="12" grpId="0"/>
+      <p:bldP spid="13" grpId="0" animBg="1"/>
+    </p:bldLst>
   </p:timing>
 </p:sld>
 </file>
@@ -5438,11 +5741,26 @@
             <p:ph idx="1"/>
           </p:nvPr>
         </p:nvSpPr>
-        <p:spPr/>
+        <p:spPr>
+          <a:xfrm>
+            <a:off x="2231136" y="4087906"/>
+            <a:ext cx="7729728" cy="1652121"/>
+          </a:xfrm>
+        </p:spPr>
         <p:txBody>
           <a:bodyPr/>
           <a:lstStyle/>
           <a:p>
+            <a:r>
+              <a:rPr lang="en-PH" dirty="0" smtClean="0"/>
+              <a:t>Positive coefficient denotes positive relationship between feature and predicted probability</a:t>
+            </a:r>
+          </a:p>
+          <a:p>
+            <a:r>
+              <a:rPr lang="en-PH" dirty="0" smtClean="0"/>
+              <a:t>Negative coefficient denotes negative relationship</a:t>
+            </a:r>
             <a:endParaRPr lang="en-PH" dirty="0"/>
           </a:p>
         </p:txBody>
@@ -5488,6 +5806,132 @@
             <a:fld id="{D65DC026-4E67-4F3D-BAB1-F739D1B8776A}" type="slidenum">
               <a:rPr lang="en-PH" smtClean="0"/>
               <a:t>12</a:t>
+            </a:fld>
+            <a:endParaRPr lang="en-PH"/>
+          </a:p>
+        </p:txBody>
+      </p:sp>
+      <p:pic>
+        <p:nvPicPr>
+          <p:cNvPr id="6" name="Picture 5"/>
+          <p:cNvPicPr>
+            <a:picLocks noChangeAspect="1"/>
+          </p:cNvPicPr>
+          <p:nvPr/>
+        </p:nvPicPr>
+        <p:blipFill>
+          <a:blip r:embed="rId2"/>
+          <a:stretch>
+            <a:fillRect/>
+          </a:stretch>
+        </p:blipFill>
+        <p:spPr>
+          <a:xfrm>
+            <a:off x="2716476" y="624213"/>
+            <a:ext cx="6759047" cy="3293363"/>
+          </a:xfrm>
+          <a:prstGeom prst="rect">
+            <a:avLst/>
+          </a:prstGeom>
+        </p:spPr>
+      </p:pic>
+    </p:spTree>
+    <p:extLst>
+      <p:ext uri="{BB962C8B-B14F-4D97-AF65-F5344CB8AC3E}">
+        <p14:creationId xmlns:p14="http://schemas.microsoft.com/office/powerpoint/2010/main" val="1431345356"/>
+      </p:ext>
+    </p:extLst>
+  </p:cSld>
+  <p:clrMapOvr>
+    <a:masterClrMapping/>
+  </p:clrMapOvr>
+  <p:timing>
+    <p:tnLst>
+      <p:par>
+        <p:cTn id="1" dur="indefinite" restart="never" nodeType="tmRoot"/>
+      </p:par>
+    </p:tnLst>
+  </p:timing>
+</p:sld>
+</file>
+
+<file path=ppt/slides/slide13.xml><?xml version="1.0" encoding="utf-8"?>
+<p:sld xmlns:a="http://schemas.openxmlformats.org/drawingml/2006/main" xmlns:r="http://schemas.openxmlformats.org/officeDocument/2006/relationships" xmlns:p="http://schemas.openxmlformats.org/presentationml/2006/main">
+  <p:cSld>
+    <p:spTree>
+      <p:nvGrpSpPr>
+        <p:cNvPr id="1" name=""/>
+        <p:cNvGrpSpPr/>
+        <p:nvPr/>
+      </p:nvGrpSpPr>
+      <p:grpSpPr>
+        <a:xfrm>
+          <a:off x="0" y="0"/>
+          <a:ext cx="0" cy="0"/>
+          <a:chOff x="0" y="0"/>
+          <a:chExt cx="0" cy="0"/>
+        </a:xfrm>
+      </p:grpSpPr>
+      <p:sp>
+        <p:nvSpPr>
+          <p:cNvPr id="3" name="Content Placeholder 2"/>
+          <p:cNvSpPr>
+            <a:spLocks noGrp="1"/>
+          </p:cNvSpPr>
+          <p:nvPr>
+            <p:ph idx="1"/>
+          </p:nvPr>
+        </p:nvSpPr>
+        <p:spPr/>
+        <p:txBody>
+          <a:bodyPr/>
+          <a:lstStyle/>
+          <a:p>
+            <a:endParaRPr lang="en-PH" dirty="0"/>
+          </a:p>
+        </p:txBody>
+      </p:sp>
+      <p:sp>
+        <p:nvSpPr>
+          <p:cNvPr id="4" name="Footer Placeholder 3"/>
+          <p:cNvSpPr>
+            <a:spLocks noGrp="1"/>
+          </p:cNvSpPr>
+          <p:nvPr>
+            <p:ph type="ftr" sz="quarter" idx="11"/>
+          </p:nvPr>
+        </p:nvSpPr>
+        <p:spPr/>
+        <p:txBody>
+          <a:bodyPr/>
+          <a:lstStyle/>
+          <a:p>
+            <a:r>
+              <a:rPr lang="en-US" smtClean="0"/>
+              <a:t>Quiamjot - Data-Driven Diagnosis: A Machine Learning Approach to Diabetes Prediction</a:t>
+            </a:r>
+            <a:endParaRPr lang="en-PH"/>
+          </a:p>
+        </p:txBody>
+      </p:sp>
+      <p:sp>
+        <p:nvSpPr>
+          <p:cNvPr id="5" name="Slide Number Placeholder 4"/>
+          <p:cNvSpPr>
+            <a:spLocks noGrp="1"/>
+          </p:cNvSpPr>
+          <p:nvPr>
+            <p:ph type="sldNum" sz="quarter" idx="12"/>
+          </p:nvPr>
+        </p:nvSpPr>
+        <p:spPr/>
+        <p:txBody>
+          <a:bodyPr/>
+          <a:lstStyle/>
+          <a:p>
+            <a:fld id="{D65DC026-4E67-4F3D-BAB1-F739D1B8776A}" type="slidenum">
+              <a:rPr lang="en-PH" smtClean="0"/>
+              <a:t>13</a:t>
             </a:fld>
             <a:endParaRPr lang="en-PH"/>
           </a:p>
@@ -5627,7 +6071,7 @@
 </p:sld>
 </file>
 
-<file path=ppt/slides/slide13.xml><?xml version="1.0" encoding="utf-8"?>
+<file path=ppt/slides/slide14.xml><?xml version="1.0" encoding="utf-8"?>
 <p:sld xmlns:a="http://schemas.openxmlformats.org/drawingml/2006/main" xmlns:r="http://schemas.openxmlformats.org/officeDocument/2006/relationships" xmlns:p="http://schemas.openxmlformats.org/presentationml/2006/main">
   <p:cSld>
     <p:spTree>
@@ -5654,6 +6098,164 @@
             <p:ph type="title"/>
           </p:nvPr>
         </p:nvSpPr>
+        <p:spPr/>
+        <p:txBody>
+          <a:bodyPr/>
+          <a:lstStyle/>
+          <a:p>
+            <a:r>
+              <a:rPr lang="en-PH" dirty="0" smtClean="0"/>
+              <a:t>conclusion</a:t>
+            </a:r>
+            <a:endParaRPr lang="en-PH" dirty="0"/>
+          </a:p>
+        </p:txBody>
+      </p:sp>
+      <p:sp>
+        <p:nvSpPr>
+          <p:cNvPr id="3" name="Content Placeholder 2"/>
+          <p:cNvSpPr>
+            <a:spLocks noGrp="1"/>
+          </p:cNvSpPr>
+          <p:nvPr>
+            <p:ph idx="1"/>
+          </p:nvPr>
+        </p:nvSpPr>
+        <p:spPr/>
+        <p:txBody>
+          <a:bodyPr/>
+          <a:lstStyle/>
+          <a:p>
+            <a:r>
+              <a:rPr lang="en-PH" dirty="0"/>
+              <a:t>P</a:t>
+            </a:r>
+            <a:r>
+              <a:rPr lang="en-PH" dirty="0" smtClean="0"/>
+              <a:t>otential of machine learning methods in predicting diabetes was demonstrated</a:t>
+            </a:r>
+          </a:p>
+          <a:p>
+            <a:r>
+              <a:rPr lang="en-PH" dirty="0" smtClean="0"/>
+              <a:t>Logistic regression: lower accuracy &amp; sensitivity,  higher specificity</a:t>
+            </a:r>
+          </a:p>
+          <a:p>
+            <a:r>
+              <a:rPr lang="en-PH" dirty="0" smtClean="0"/>
+              <a:t>Random forest classifier: higher accuracy &amp; sensitivity, lower specificity</a:t>
+            </a:r>
+          </a:p>
+          <a:p>
+            <a:r>
+              <a:rPr lang="en-US" dirty="0" smtClean="0"/>
+              <a:t>These </a:t>
+            </a:r>
+            <a:r>
+              <a:rPr lang="en-US" dirty="0"/>
+              <a:t>models can serve as valuable tools in the early detection of diabetes</a:t>
+            </a:r>
+            <a:endParaRPr lang="en-PH" dirty="0" smtClean="0"/>
+          </a:p>
+          <a:p>
+            <a:endParaRPr lang="en-PH" dirty="0"/>
+          </a:p>
+        </p:txBody>
+      </p:sp>
+      <p:sp>
+        <p:nvSpPr>
+          <p:cNvPr id="4" name="Footer Placeholder 3"/>
+          <p:cNvSpPr>
+            <a:spLocks noGrp="1"/>
+          </p:cNvSpPr>
+          <p:nvPr>
+            <p:ph type="ftr" sz="quarter" idx="11"/>
+          </p:nvPr>
+        </p:nvSpPr>
+        <p:spPr/>
+        <p:txBody>
+          <a:bodyPr/>
+          <a:lstStyle/>
+          <a:p>
+            <a:r>
+              <a:rPr lang="en-US" smtClean="0"/>
+              <a:t>Quiamjot - Data-Driven Diagnosis: A Machine Learning Approach to Diabetes Prediction</a:t>
+            </a:r>
+            <a:endParaRPr lang="en-PH"/>
+          </a:p>
+        </p:txBody>
+      </p:sp>
+      <p:sp>
+        <p:nvSpPr>
+          <p:cNvPr id="5" name="Slide Number Placeholder 4"/>
+          <p:cNvSpPr>
+            <a:spLocks noGrp="1"/>
+          </p:cNvSpPr>
+          <p:nvPr>
+            <p:ph type="sldNum" sz="quarter" idx="12"/>
+          </p:nvPr>
+        </p:nvSpPr>
+        <p:spPr/>
+        <p:txBody>
+          <a:bodyPr/>
+          <a:lstStyle/>
+          <a:p>
+            <a:fld id="{D65DC026-4E67-4F3D-BAB1-F739D1B8776A}" type="slidenum">
+              <a:rPr lang="en-PH" smtClean="0"/>
+              <a:t>14</a:t>
+            </a:fld>
+            <a:endParaRPr lang="en-PH"/>
+          </a:p>
+        </p:txBody>
+      </p:sp>
+    </p:spTree>
+    <p:extLst>
+      <p:ext uri="{BB962C8B-B14F-4D97-AF65-F5344CB8AC3E}">
+        <p14:creationId xmlns:p14="http://schemas.microsoft.com/office/powerpoint/2010/main" val="1528588856"/>
+      </p:ext>
+    </p:extLst>
+  </p:cSld>
+  <p:clrMapOvr>
+    <a:masterClrMapping/>
+  </p:clrMapOvr>
+  <p:timing>
+    <p:tnLst>
+      <p:par>
+        <p:cTn id="1" dur="indefinite" restart="never" nodeType="tmRoot"/>
+      </p:par>
+    </p:tnLst>
+  </p:timing>
+</p:sld>
+</file>
+
+<file path=ppt/slides/slide15.xml><?xml version="1.0" encoding="utf-8"?>
+<p:sld xmlns:a="http://schemas.openxmlformats.org/drawingml/2006/main" xmlns:r="http://schemas.openxmlformats.org/officeDocument/2006/relationships" xmlns:p="http://schemas.openxmlformats.org/presentationml/2006/main">
+  <p:cSld>
+    <p:spTree>
+      <p:nvGrpSpPr>
+        <p:cNvPr id="1" name=""/>
+        <p:cNvGrpSpPr/>
+        <p:nvPr/>
+      </p:nvGrpSpPr>
+      <p:grpSpPr>
+        <a:xfrm>
+          <a:off x="0" y="0"/>
+          <a:ext cx="0" cy="0"/>
+          <a:chOff x="0" y="0"/>
+          <a:chExt cx="0" cy="0"/>
+        </a:xfrm>
+      </p:grpSpPr>
+      <p:sp>
+        <p:nvSpPr>
+          <p:cNvPr id="2" name="Title 1"/>
+          <p:cNvSpPr>
+            <a:spLocks noGrp="1"/>
+          </p:cNvSpPr>
+          <p:nvPr>
+            <p:ph type="title"/>
+          </p:nvPr>
+        </p:nvSpPr>
         <p:spPr>
           <a:xfrm>
             <a:off x="2231136" y="964691"/>
@@ -5670,6 +6272,10 @@
               <a:rPr lang="en-PH" dirty="0" smtClean="0"/>
               <a:t>Moral of the story: </a:t>
             </a:r>
+            <a:r>
+              <a:rPr lang="en-PH" dirty="0" smtClean="0"/>
+              <a:t/>
+            </a:r>
             <a:br>
               <a:rPr lang="en-PH" dirty="0" smtClean="0"/>
             </a:br>
@@ -5728,7 +6334,7 @@
           <a:p>
             <a:fld id="{D65DC026-4E67-4F3D-BAB1-F739D1B8776A}" type="slidenum">
               <a:rPr lang="en-PH" smtClean="0"/>
-              <a:t>13</a:t>
+              <a:t>15</a:t>
             </a:fld>
             <a:endParaRPr lang="en-PH"/>
           </a:p>
@@ -5738,6 +6344,177 @@
     <p:extLst>
       <p:ext uri="{BB962C8B-B14F-4D97-AF65-F5344CB8AC3E}">
         <p14:creationId xmlns:p14="http://schemas.microsoft.com/office/powerpoint/2010/main" val="2995616799"/>
+      </p:ext>
+    </p:extLst>
+  </p:cSld>
+  <p:clrMapOvr>
+    <a:masterClrMapping/>
+  </p:clrMapOvr>
+  <p:timing>
+    <p:tnLst>
+      <p:par>
+        <p:cTn id="1" dur="indefinite" restart="never" nodeType="tmRoot"/>
+      </p:par>
+    </p:tnLst>
+  </p:timing>
+</p:sld>
+</file>
+
+<file path=ppt/slides/slide16.xml><?xml version="1.0" encoding="utf-8"?>
+<p:sld xmlns:a="http://schemas.openxmlformats.org/drawingml/2006/main" xmlns:r="http://schemas.openxmlformats.org/officeDocument/2006/relationships" xmlns:p="http://schemas.openxmlformats.org/presentationml/2006/main">
+  <p:cSld>
+    <p:spTree>
+      <p:nvGrpSpPr>
+        <p:cNvPr id="1" name=""/>
+        <p:cNvGrpSpPr/>
+        <p:nvPr/>
+      </p:nvGrpSpPr>
+      <p:grpSpPr>
+        <a:xfrm>
+          <a:off x="0" y="0"/>
+          <a:ext cx="0" cy="0"/>
+          <a:chOff x="0" y="0"/>
+          <a:chExt cx="0" cy="0"/>
+        </a:xfrm>
+      </p:grpSpPr>
+      <p:sp>
+        <p:nvSpPr>
+          <p:cNvPr id="2" name="Title 1"/>
+          <p:cNvSpPr>
+            <a:spLocks noGrp="1"/>
+          </p:cNvSpPr>
+          <p:nvPr>
+            <p:ph type="title"/>
+          </p:nvPr>
+        </p:nvSpPr>
+        <p:spPr/>
+        <p:txBody>
+          <a:bodyPr/>
+          <a:lstStyle/>
+          <a:p>
+            <a:r>
+              <a:rPr lang="en-PH" dirty="0" smtClean="0"/>
+              <a:t>references</a:t>
+            </a:r>
+            <a:endParaRPr lang="en-PH" dirty="0"/>
+          </a:p>
+        </p:txBody>
+      </p:sp>
+      <p:sp>
+        <p:nvSpPr>
+          <p:cNvPr id="3" name="Content Placeholder 2"/>
+          <p:cNvSpPr>
+            <a:spLocks noGrp="1"/>
+          </p:cNvSpPr>
+          <p:nvPr>
+            <p:ph idx="1"/>
+          </p:nvPr>
+        </p:nvSpPr>
+        <p:spPr/>
+        <p:txBody>
+          <a:bodyPr>
+            <a:normAutofit/>
+          </a:bodyPr>
+          <a:lstStyle/>
+          <a:p>
+            <a:r>
+              <a:rPr lang="en-PH" dirty="0" smtClean="0"/>
+              <a:t>Chou </a:t>
+            </a:r>
+            <a:r>
+              <a:rPr lang="en-PH" dirty="0"/>
+              <a:t>CY, Hsu DY, Chou CH. Predicting the Onset of Diabetes with Machine Learning Methods. J </a:t>
+            </a:r>
+            <a:r>
+              <a:rPr lang="en-PH" dirty="0" err="1"/>
+              <a:t>Pers</a:t>
+            </a:r>
+            <a:r>
+              <a:rPr lang="en-PH" dirty="0"/>
+              <a:t> Med. 2023 Feb 24;13(3):406. </a:t>
+            </a:r>
+            <a:r>
+              <a:rPr lang="en-PH" dirty="0" err="1"/>
+              <a:t>doi</a:t>
+            </a:r>
+            <a:r>
+              <a:rPr lang="en-PH" dirty="0"/>
+              <a:t>: 10.3390/jpm13030406. PMID: 36983587; PMCID: PMC10057336 </a:t>
+            </a:r>
+          </a:p>
+          <a:p>
+            <a:r>
+              <a:rPr lang="pt-BR" dirty="0"/>
+              <a:t> Pima Indians Diabetes Database. Retrieved from https://www.kaggle.com/datasets/uciml/pima-indians-diabetes-database </a:t>
+            </a:r>
+            <a:endParaRPr lang="en-PH" dirty="0"/>
+          </a:p>
+          <a:p>
+            <a:r>
+              <a:rPr lang="en-US" dirty="0"/>
+              <a:t> What is Logistic Regression?. Retrieved from https://www.spiceworks.com/tech/artificial-intelligence/articles/what-is-logistic-regression/ </a:t>
+            </a:r>
+            <a:endParaRPr lang="en-US" dirty="0" smtClean="0"/>
+          </a:p>
+          <a:p>
+            <a:r>
+              <a:rPr lang="en-US" dirty="0" smtClean="0"/>
+              <a:t>IMAGES ARE OPEN SOURCE</a:t>
+            </a:r>
+            <a:endParaRPr lang="en-PH" dirty="0"/>
+          </a:p>
+        </p:txBody>
+      </p:sp>
+      <p:sp>
+        <p:nvSpPr>
+          <p:cNvPr id="4" name="Footer Placeholder 3"/>
+          <p:cNvSpPr>
+            <a:spLocks noGrp="1"/>
+          </p:cNvSpPr>
+          <p:nvPr>
+            <p:ph type="ftr" sz="quarter" idx="11"/>
+          </p:nvPr>
+        </p:nvSpPr>
+        <p:spPr/>
+        <p:txBody>
+          <a:bodyPr/>
+          <a:lstStyle/>
+          <a:p>
+            <a:r>
+              <a:rPr lang="en-US" smtClean="0"/>
+              <a:t>Quiamjot - Data-Driven Diagnosis: A Machine Learning Approach to Diabetes Prediction</a:t>
+            </a:r>
+            <a:endParaRPr lang="en-PH"/>
+          </a:p>
+        </p:txBody>
+      </p:sp>
+      <p:sp>
+        <p:nvSpPr>
+          <p:cNvPr id="5" name="Slide Number Placeholder 4"/>
+          <p:cNvSpPr>
+            <a:spLocks noGrp="1"/>
+          </p:cNvSpPr>
+          <p:nvPr>
+            <p:ph type="sldNum" sz="quarter" idx="12"/>
+          </p:nvPr>
+        </p:nvSpPr>
+        <p:spPr/>
+        <p:txBody>
+          <a:bodyPr/>
+          <a:lstStyle/>
+          <a:p>
+            <a:fld id="{D65DC026-4E67-4F3D-BAB1-F739D1B8776A}" type="slidenum">
+              <a:rPr lang="en-PH" smtClean="0"/>
+              <a:t>16</a:t>
+            </a:fld>
+            <a:endParaRPr lang="en-PH"/>
+          </a:p>
+        </p:txBody>
+      </p:sp>
+    </p:spTree>
+    <p:extLst>
+      <p:ext uri="{BB962C8B-B14F-4D97-AF65-F5344CB8AC3E}">
+        <p14:creationId xmlns:p14="http://schemas.microsoft.com/office/powerpoint/2010/main" val="1537069108"/>
       </p:ext>
     </p:extLst>
   </p:cSld>
@@ -6348,13 +7125,11 @@
           <a:p>
             <a:r>
               <a:rPr lang="en-PH" dirty="0" smtClean="0"/>
-              <a:t>Performs well when features and target have linear relationship</a:t>
-            </a:r>
-          </a:p>
-          <a:p>
+              <a:t>Prioritizes </a:t>
+            </a:r>
             <a:r>
               <a:rPr lang="en-PH" dirty="0" smtClean="0"/>
-              <a:t>Prioritizes interpretability</a:t>
+              <a:t>interpretability</a:t>
             </a:r>
             <a:endParaRPr lang="en-PH" dirty="0"/>
           </a:p>
@@ -6660,13 +7435,11 @@
           <a:p>
             <a:r>
               <a:rPr lang="en-PH" dirty="0" smtClean="0"/>
-              <a:t>Prone to overfitting if not properly tuned</a:t>
-            </a:r>
-          </a:p>
-          <a:p>
+              <a:t>Prioritizes </a:t>
+            </a:r>
             <a:r>
               <a:rPr lang="en-PH" dirty="0" smtClean="0"/>
-              <a:t>Prioritizes accuracy</a:t>
+              <a:t>accuracy</a:t>
             </a:r>
             <a:endParaRPr lang="en-PH" dirty="0"/>
           </a:p>
@@ -7030,104 +7803,6 @@
                       </p:childTnLst>
                     </p:cTn>
                   </p:par>
-                  <p:par>
-                    <p:cTn id="27" fill="hold">
-                      <p:stCondLst>
-                        <p:cond delay="indefinite"/>
-                      </p:stCondLst>
-                      <p:childTnLst>
-                        <p:par>
-                          <p:cTn id="28" fill="hold">
-                            <p:stCondLst>
-                              <p:cond delay="0"/>
-                            </p:stCondLst>
-                            <p:childTnLst>
-                              <p:par>
-                                <p:cTn id="29" presetID="1" presetClass="entr" presetSubtype="0" fill="hold" nodeType="clickEffect">
-                                  <p:stCondLst>
-                                    <p:cond delay="0"/>
-                                  </p:stCondLst>
-                                  <p:childTnLst>
-                                    <p:set>
-                                      <p:cBhvr>
-                                        <p:cTn id="30" dur="1" fill="hold">
-                                          <p:stCondLst>
-                                            <p:cond delay="0"/>
-                                          </p:stCondLst>
-                                        </p:cTn>
-                                        <p:tgtEl>
-                                          <p:spTgt spid="3">
-                                            <p:txEl>
-                                              <p:pRg st="3" end="3"/>
-                                            </p:txEl>
-                                          </p:spTgt>
-                                        </p:tgtEl>
-                                        <p:attrNameLst>
-                                          <p:attrName>style.visibility</p:attrName>
-                                        </p:attrNameLst>
-                                      </p:cBhvr>
-                                      <p:to>
-                                        <p:strVal val="visible"/>
-                                      </p:to>
-                                    </p:set>
-                                  </p:childTnLst>
-                                </p:cTn>
-                              </p:par>
-                            </p:childTnLst>
-                          </p:cTn>
-                        </p:par>
-                      </p:childTnLst>
-                    </p:cTn>
-                  </p:par>
-                  <p:par>
-                    <p:cTn id="31" fill="hold">
-                      <p:stCondLst>
-                        <p:cond delay="indefinite"/>
-                      </p:stCondLst>
-                      <p:childTnLst>
-                        <p:par>
-                          <p:cTn id="32" fill="hold">
-                            <p:stCondLst>
-                              <p:cond delay="0"/>
-                            </p:stCondLst>
-                            <p:childTnLst>
-                              <p:par>
-                                <p:cTn id="33" presetID="1" presetClass="entr" presetSubtype="0" fill="hold" nodeType="clickEffect">
-                                  <p:stCondLst>
-                                    <p:cond delay="0"/>
-                                  </p:stCondLst>
-                                  <p:childTnLst>
-                                    <p:set>
-                                      <p:cBhvr>
-                                        <p:cTn id="34" dur="1" fill="hold">
-                                          <p:stCondLst>
-                                            <p:cond delay="0"/>
-                                          </p:stCondLst>
-                                        </p:cTn>
-                                        <p:tgtEl>
-                                          <p:spTgt spid="5">
-                                            <p:txEl>
-                                              <p:pRg st="3" end="3"/>
-                                            </p:txEl>
-                                          </p:spTgt>
-                                        </p:tgtEl>
-                                        <p:attrNameLst>
-                                          <p:attrName>style.visibility</p:attrName>
-                                        </p:attrNameLst>
-                                      </p:cBhvr>
-                                      <p:to>
-                                        <p:strVal val="visible"/>
-                                      </p:to>
-                                    </p:set>
-                                  </p:childTnLst>
-                                </p:cTn>
-                              </p:par>
-                            </p:childTnLst>
-                          </p:cTn>
-                        </p:par>
-                      </p:childTnLst>
-                    </p:cTn>
-                  </p:par>
                 </p:childTnLst>
               </p:cTn>
               <p:prevCondLst>
@@ -7640,6 +8315,86 @@
           </a:extLst>
         </p:spPr>
       </p:pic>
+      <p:pic>
+        <p:nvPicPr>
+          <p:cNvPr id="1026" name="Picture 2" descr="What is Logistic Regression? - Logistic Regression Model Explained - AWS"/>
+          <p:cNvPicPr>
+            <a:picLocks noChangeAspect="1" noChangeArrowheads="1"/>
+          </p:cNvPicPr>
+          <p:nvPr/>
+        </p:nvPicPr>
+        <p:blipFill>
+          <a:blip r:embed="rId4" cstate="print">
+            <a:extLst>
+              <a:ext uri="{28A0092B-C50C-407E-A947-70E740481C1C}">
+                <a14:useLocalDpi xmlns:a14="http://schemas.microsoft.com/office/drawing/2010/main" val="0"/>
+              </a:ext>
+            </a:extLst>
+          </a:blip>
+          <a:srcRect/>
+          <a:stretch>
+            <a:fillRect/>
+          </a:stretch>
+        </p:blipFill>
+        <p:spPr bwMode="auto">
+          <a:xfrm>
+            <a:off x="4065277" y="4366918"/>
+            <a:ext cx="1608211" cy="641979"/>
+          </a:xfrm>
+          <a:prstGeom prst="rect">
+            <a:avLst/>
+          </a:prstGeom>
+          <a:noFill/>
+          <a:extLst>
+            <a:ext uri="{909E8E84-426E-40DD-AFC4-6F175D3DCCD1}">
+              <a14:hiddenFill xmlns:a14="http://schemas.microsoft.com/office/drawing/2010/main">
+                <a:solidFill>
+                  <a:srgbClr val="FFFFFF"/>
+                </a:solidFill>
+              </a14:hiddenFill>
+            </a:ext>
+          </a:extLst>
+        </p:spPr>
+      </p:pic>
+      <p:pic>
+        <p:nvPicPr>
+          <p:cNvPr id="1028" name="Picture 4" descr="Logistic Regression Algorithm in just 4 steps! | by Rohit Batra | Medium"/>
+          <p:cNvPicPr>
+            <a:picLocks noChangeAspect="1" noChangeArrowheads="1"/>
+          </p:cNvPicPr>
+          <p:nvPr/>
+        </p:nvPicPr>
+        <p:blipFill rotWithShape="1">
+          <a:blip r:embed="rId5">
+            <a:extLst>
+              <a:ext uri="{28A0092B-C50C-407E-A947-70E740481C1C}">
+                <a14:useLocalDpi xmlns:a14="http://schemas.microsoft.com/office/drawing/2010/main" val="0"/>
+              </a:ext>
+            </a:extLst>
+          </a:blip>
+          <a:srcRect t="27608" b="18811"/>
+          <a:stretch/>
+        </p:blipFill>
+        <p:spPr bwMode="auto">
+          <a:xfrm>
+            <a:off x="1753669" y="5662688"/>
+            <a:ext cx="4227448" cy="672860"/>
+          </a:xfrm>
+          <a:prstGeom prst="rect">
+            <a:avLst/>
+          </a:prstGeom>
+          <a:noFill/>
+          <a:extLst>
+            <a:ext uri="{909E8E84-426E-40DD-AFC4-6F175D3DCCD1}">
+              <a14:hiddenFill xmlns:a14="http://schemas.microsoft.com/office/drawing/2010/main">
+                <a:solidFill>
+                  <a:srgbClr val="FFFFFF"/>
+                </a:solidFill>
+              </a14:hiddenFill>
+            </a:ext>
+          </a:extLst>
+        </p:spPr>
+      </p:pic>
     </p:spTree>
     <p:extLst>
       <p:ext uri="{BB962C8B-B14F-4D97-AF65-F5344CB8AC3E}">
@@ -8893,7 +9648,7 @@
         </p:nvSpPr>
         <p:spPr>
           <a:xfrm>
-            <a:off x="0" y="0"/>
+            <a:off x="5179933" y="2987736"/>
             <a:ext cx="1777042" cy="465050"/>
           </a:xfrm>
           <a:prstGeom prst="rect">
@@ -8942,9 +9697,281 @@
   <p:timing>
     <p:tnLst>
       <p:par>
-        <p:cTn id="1" dur="indefinite" restart="never" nodeType="tmRoot"/>
+        <p:cTn id="1" dur="indefinite" restart="never" nodeType="tmRoot">
+          <p:childTnLst>
+            <p:seq concurrent="1" nextAc="seek">
+              <p:cTn id="2" dur="indefinite" nodeType="mainSeq">
+                <p:childTnLst>
+                  <p:par>
+                    <p:cTn id="3" fill="hold">
+                      <p:stCondLst>
+                        <p:cond delay="indefinite"/>
+                      </p:stCondLst>
+                      <p:childTnLst>
+                        <p:par>
+                          <p:cTn id="4" fill="hold">
+                            <p:stCondLst>
+                              <p:cond delay="0"/>
+                            </p:stCondLst>
+                            <p:childTnLst>
+                              <p:par>
+                                <p:cTn id="5" presetID="42" presetClass="path" presetSubtype="0" accel="50000" decel="50000" fill="hold" grpId="0" nodeType="clickEffect">
+                                  <p:stCondLst>
+                                    <p:cond delay="0"/>
+                                  </p:stCondLst>
+                                  <p:childTnLst>
+                                    <p:animMotion origin="layout" path="M 3.75E-6 -4.44444E-6 L -0.42487 -0.43958 " pathEditMode="relative" rAng="0" ptsTypes="AA">
+                                      <p:cBhvr>
+                                        <p:cTn id="6" dur="300" fill="hold"/>
+                                        <p:tgtEl>
+                                          <p:spTgt spid="13"/>
+                                        </p:tgtEl>
+                                        <p:attrNameLst>
+                                          <p:attrName>ppt_x</p:attrName>
+                                          <p:attrName>ppt_y</p:attrName>
+                                        </p:attrNameLst>
+                                      </p:cBhvr>
+                                      <p:rCtr x="-21250" y="-21991"/>
+                                    </p:animMotion>
+                                  </p:childTnLst>
+                                </p:cTn>
+                              </p:par>
+                              <p:par>
+                                <p:cTn id="7" presetID="10" presetClass="entr" presetSubtype="0" fill="hold" grpId="0" nodeType="withEffect">
+                                  <p:stCondLst>
+                                    <p:cond delay="0"/>
+                                  </p:stCondLst>
+                                  <p:childTnLst>
+                                    <p:set>
+                                      <p:cBhvr>
+                                        <p:cTn id="8" dur="1" fill="hold">
+                                          <p:stCondLst>
+                                            <p:cond delay="0"/>
+                                          </p:stCondLst>
+                                        </p:cTn>
+                                        <p:tgtEl>
+                                          <p:spTgt spid="11"/>
+                                        </p:tgtEl>
+                                        <p:attrNameLst>
+                                          <p:attrName>style.visibility</p:attrName>
+                                        </p:attrNameLst>
+                                      </p:cBhvr>
+                                      <p:to>
+                                        <p:strVal val="visible"/>
+                                      </p:to>
+                                    </p:set>
+                                    <p:animEffect transition="in" filter="fade">
+                                      <p:cBhvr>
+                                        <p:cTn id="9" dur="1000"/>
+                                        <p:tgtEl>
+                                          <p:spTgt spid="11"/>
+                                        </p:tgtEl>
+                                      </p:cBhvr>
+                                    </p:animEffect>
+                                  </p:childTnLst>
+                                </p:cTn>
+                              </p:par>
+                              <p:par>
+                                <p:cTn id="10" presetID="10" presetClass="entr" presetSubtype="0" fill="hold" nodeType="withEffect">
+                                  <p:stCondLst>
+                                    <p:cond delay="0"/>
+                                  </p:stCondLst>
+                                  <p:childTnLst>
+                                    <p:set>
+                                      <p:cBhvr>
+                                        <p:cTn id="11" dur="1" fill="hold">
+                                          <p:stCondLst>
+                                            <p:cond delay="0"/>
+                                          </p:stCondLst>
+                                        </p:cTn>
+                                        <p:tgtEl>
+                                          <p:spTgt spid="7"/>
+                                        </p:tgtEl>
+                                        <p:attrNameLst>
+                                          <p:attrName>style.visibility</p:attrName>
+                                        </p:attrNameLst>
+                                      </p:cBhvr>
+                                      <p:to>
+                                        <p:strVal val="visible"/>
+                                      </p:to>
+                                    </p:set>
+                                    <p:animEffect transition="in" filter="fade">
+                                      <p:cBhvr>
+                                        <p:cTn id="12" dur="1000"/>
+                                        <p:tgtEl>
+                                          <p:spTgt spid="7"/>
+                                        </p:tgtEl>
+                                      </p:cBhvr>
+                                    </p:animEffect>
+                                  </p:childTnLst>
+                                </p:cTn>
+                              </p:par>
+                              <p:par>
+                                <p:cTn id="13" presetID="10" presetClass="entr" presetSubtype="0" fill="hold" grpId="0" nodeType="withEffect">
+                                  <p:stCondLst>
+                                    <p:cond delay="0"/>
+                                  </p:stCondLst>
+                                  <p:childTnLst>
+                                    <p:set>
+                                      <p:cBhvr>
+                                        <p:cTn id="14" dur="1" fill="hold">
+                                          <p:stCondLst>
+                                            <p:cond delay="0"/>
+                                          </p:stCondLst>
+                                        </p:cTn>
+                                        <p:tgtEl>
+                                          <p:spTgt spid="2"/>
+                                        </p:tgtEl>
+                                        <p:attrNameLst>
+                                          <p:attrName>style.visibility</p:attrName>
+                                        </p:attrNameLst>
+                                      </p:cBhvr>
+                                      <p:to>
+                                        <p:strVal val="visible"/>
+                                      </p:to>
+                                    </p:set>
+                                    <p:animEffect transition="in" filter="fade">
+                                      <p:cBhvr>
+                                        <p:cTn id="15" dur="1000"/>
+                                        <p:tgtEl>
+                                          <p:spTgt spid="2"/>
+                                        </p:tgtEl>
+                                      </p:cBhvr>
+                                    </p:animEffect>
+                                  </p:childTnLst>
+                                </p:cTn>
+                              </p:par>
+                              <p:par>
+                                <p:cTn id="16" presetID="10" presetClass="entr" presetSubtype="0" fill="hold" grpId="0" nodeType="withEffect">
+                                  <p:stCondLst>
+                                    <p:cond delay="0"/>
+                                  </p:stCondLst>
+                                  <p:childTnLst>
+                                    <p:set>
+                                      <p:cBhvr>
+                                        <p:cTn id="17" dur="1" fill="hold">
+                                          <p:stCondLst>
+                                            <p:cond delay="0"/>
+                                          </p:stCondLst>
+                                        </p:cTn>
+                                        <p:tgtEl>
+                                          <p:spTgt spid="4"/>
+                                        </p:tgtEl>
+                                        <p:attrNameLst>
+                                          <p:attrName>style.visibility</p:attrName>
+                                        </p:attrNameLst>
+                                      </p:cBhvr>
+                                      <p:to>
+                                        <p:strVal val="visible"/>
+                                      </p:to>
+                                    </p:set>
+                                    <p:animEffect transition="in" filter="fade">
+                                      <p:cBhvr>
+                                        <p:cTn id="18" dur="1000"/>
+                                        <p:tgtEl>
+                                          <p:spTgt spid="4"/>
+                                        </p:tgtEl>
+                                      </p:cBhvr>
+                                    </p:animEffect>
+                                  </p:childTnLst>
+                                </p:cTn>
+                              </p:par>
+                              <p:par>
+                                <p:cTn id="19" presetID="10" presetClass="entr" presetSubtype="0" fill="hold" nodeType="withEffect">
+                                  <p:stCondLst>
+                                    <p:cond delay="0"/>
+                                  </p:stCondLst>
+                                  <p:childTnLst>
+                                    <p:set>
+                                      <p:cBhvr>
+                                        <p:cTn id="20" dur="1" fill="hold">
+                                          <p:stCondLst>
+                                            <p:cond delay="0"/>
+                                          </p:stCondLst>
+                                        </p:cTn>
+                                        <p:tgtEl>
+                                          <p:spTgt spid="10"/>
+                                        </p:tgtEl>
+                                        <p:attrNameLst>
+                                          <p:attrName>style.visibility</p:attrName>
+                                        </p:attrNameLst>
+                                      </p:cBhvr>
+                                      <p:to>
+                                        <p:strVal val="visible"/>
+                                      </p:to>
+                                    </p:set>
+                                    <p:animEffect transition="in" filter="fade">
+                                      <p:cBhvr>
+                                        <p:cTn id="21" dur="1000"/>
+                                        <p:tgtEl>
+                                          <p:spTgt spid="10"/>
+                                        </p:tgtEl>
+                                      </p:cBhvr>
+                                    </p:animEffect>
+                                  </p:childTnLst>
+                                </p:cTn>
+                              </p:par>
+                              <p:par>
+                                <p:cTn id="22" presetID="1" presetClass="entr" presetSubtype="0" fill="hold" grpId="0" nodeType="withEffect">
+                                  <p:stCondLst>
+                                    <p:cond delay="0"/>
+                                  </p:stCondLst>
+                                  <p:childTnLst>
+                                    <p:set>
+                                      <p:cBhvr>
+                                        <p:cTn id="23" dur="1" fill="hold">
+                                          <p:stCondLst>
+                                            <p:cond delay="999"/>
+                                          </p:stCondLst>
+                                        </p:cTn>
+                                        <p:tgtEl>
+                                          <p:spTgt spid="12"/>
+                                        </p:tgtEl>
+                                        <p:attrNameLst>
+                                          <p:attrName>style.visibility</p:attrName>
+                                        </p:attrNameLst>
+                                      </p:cBhvr>
+                                      <p:to>
+                                        <p:strVal val="visible"/>
+                                      </p:to>
+                                    </p:set>
+                                  </p:childTnLst>
+                                </p:cTn>
+                              </p:par>
+                            </p:childTnLst>
+                          </p:cTn>
+                        </p:par>
+                      </p:childTnLst>
+                    </p:cTn>
+                  </p:par>
+                </p:childTnLst>
+              </p:cTn>
+              <p:prevCondLst>
+                <p:cond evt="onPrev" delay="0">
+                  <p:tgtEl>
+                    <p:sldTgt/>
+                  </p:tgtEl>
+                </p:cond>
+              </p:prevCondLst>
+              <p:nextCondLst>
+                <p:cond evt="onNext" delay="0">
+                  <p:tgtEl>
+                    <p:sldTgt/>
+                  </p:tgtEl>
+                </p:cond>
+              </p:nextCondLst>
+            </p:seq>
+          </p:childTnLst>
+        </p:cTn>
       </p:par>
     </p:tnLst>
+    <p:bldLst>
+      <p:bldP spid="2" grpId="0" animBg="1"/>
+      <p:bldP spid="4" grpId="0" animBg="1"/>
+      <p:bldP spid="11" grpId="0"/>
+      <p:bldP spid="12" grpId="0"/>
+      <p:bldP spid="13" grpId="0" animBg="1"/>
+    </p:bldLst>
   </p:timing>
 </p:sld>
 </file>
@@ -9471,21 +10498,6 @@
 </file>
 
 <file path=customXml/item1.xml><?xml version="1.0" encoding="utf-8"?>
-<p:properties xmlns:p="http://schemas.microsoft.com/office/2006/metadata/properties" xmlns:xsi="http://www.w3.org/2001/XMLSchema-instance" xmlns:pc="http://schemas.microsoft.com/office/infopath/2007/PartnerControls">
-  <documentManagement/>
-</p:properties>
-</file>
-
-<file path=customXml/item2.xml><?xml version="1.0" encoding="utf-8"?>
-<?mso-contentType ?>
-<FormTemplates xmlns="http://schemas.microsoft.com/sharepoint/v3/contenttype/forms">
-  <Display>DocumentLibraryForm</Display>
-  <Edit>DocumentLibraryForm</Edit>
-  <New>DocumentLibraryForm</New>
-</FormTemplates>
-</file>
-
-<file path=customXml/item3.xml><?xml version="1.0" encoding="utf-8"?>
 <ct:contentTypeSchema xmlns:ct="http://schemas.microsoft.com/office/2006/metadata/contentType" xmlns:ma="http://schemas.microsoft.com/office/2006/metadata/properties/metaAttributes" ct:_="" ma:_="" ma:contentTypeName="Document" ma:contentTypeID="0x01010010B9551B443F9E4A9D337544844F29FB" ma:contentTypeVersion="11" ma:contentTypeDescription="Create a new document." ma:contentTypeScope="" ma:versionID="154db44b828f7db9828e7b101a897763">
   <xsd:schema xmlns:xsd="http://www.w3.org/2001/XMLSchema" xmlns:xs="http://www.w3.org/2001/XMLSchema" xmlns:p="http://schemas.microsoft.com/office/2006/metadata/properties" xmlns:ns3="dc95a6b5-d2b4-4538-9df1-7a16f4196303" targetNamespace="http://schemas.microsoft.com/office/2006/metadata/properties" ma:root="true" ma:fieldsID="839bd4728b8a61443b6233d6e5e9e30e" ns3:_="">
     <xsd:import namespace="dc95a6b5-d2b4-4538-9df1-7a16f4196303"/>
@@ -9673,31 +10685,22 @@
 </ct:contentTypeSchema>
 </file>
 
-<file path=customXml/itemProps1.xml><?xml version="1.0" encoding="utf-8"?>
-<ds:datastoreItem xmlns:ds="http://schemas.openxmlformats.org/officeDocument/2006/customXml" ds:itemID="{BBBBDC2F-23FD-461E-B3CB-F36D246E03EE}">
-  <ds:schemaRefs>
-    <ds:schemaRef ds:uri="http://schemas.microsoft.com/office/2006/documentManagement/types"/>
-    <ds:schemaRef ds:uri="http://schemas.microsoft.com/office/2006/metadata/properties"/>
-    <ds:schemaRef ds:uri="http://purl.org/dc/terms/"/>
-    <ds:schemaRef ds:uri="http://purl.org/dc/dcmitype/"/>
-    <ds:schemaRef ds:uri="dc95a6b5-d2b4-4538-9df1-7a16f4196303"/>
-    <ds:schemaRef ds:uri="http://purl.org/dc/elements/1.1/"/>
-    <ds:schemaRef ds:uri="http://schemas.openxmlformats.org/package/2006/metadata/core-properties"/>
-    <ds:schemaRef ds:uri="http://schemas.microsoft.com/office/infopath/2007/PartnerControls"/>
-    <ds:schemaRef ds:uri="http://www.w3.org/XML/1998/namespace"/>
-  </ds:schemaRefs>
-</ds:datastoreItem>
+<file path=customXml/item2.xml><?xml version="1.0" encoding="utf-8"?>
+<?mso-contentType ?>
+<FormTemplates xmlns="http://schemas.microsoft.com/sharepoint/v3/contenttype/forms">
+  <Display>DocumentLibraryForm</Display>
+  <Edit>DocumentLibraryForm</Edit>
+  <New>DocumentLibraryForm</New>
+</FormTemplates>
 </file>
 
-<file path=customXml/itemProps2.xml><?xml version="1.0" encoding="utf-8"?>
-<ds:datastoreItem xmlns:ds="http://schemas.openxmlformats.org/officeDocument/2006/customXml" ds:itemID="{B89DA78E-B6B9-45C0-9E67-541174A52262}">
-  <ds:schemaRefs>
-    <ds:schemaRef ds:uri="http://schemas.microsoft.com/sharepoint/v3/contenttype/forms"/>
-  </ds:schemaRefs>
-</ds:datastoreItem>
+<file path=customXml/item3.xml><?xml version="1.0" encoding="utf-8"?>
+<p:properties xmlns:p="http://schemas.microsoft.com/office/2006/metadata/properties" xmlns:xsi="http://www.w3.org/2001/XMLSchema-instance" xmlns:pc="http://schemas.microsoft.com/office/infopath/2007/PartnerControls">
+  <documentManagement/>
+</p:properties>
 </file>
 
-<file path=customXml/itemProps3.xml><?xml version="1.0" encoding="utf-8"?>
+<file path=customXml/itemProps1.xml><?xml version="1.0" encoding="utf-8"?>
 <ds:datastoreItem xmlns:ds="http://schemas.openxmlformats.org/officeDocument/2006/customXml" ds:itemID="{8E2A6A2E-F7C9-4323-A231-BCC685B0B28E}">
   <ds:schemaRefs>
     <ds:schemaRef ds:uri="http://schemas.microsoft.com/office/2006/metadata/contentType"/>
@@ -9713,4 +10716,28 @@
     <ds:schemaRef ds:uri="http://schemas.microsoft.com/internal/obd"/>
   </ds:schemaRefs>
 </ds:datastoreItem>
+</file>
+
+<file path=customXml/itemProps2.xml><?xml version="1.0" encoding="utf-8"?>
+<ds:datastoreItem xmlns:ds="http://schemas.openxmlformats.org/officeDocument/2006/customXml" ds:itemID="{B89DA78E-B6B9-45C0-9E67-541174A52262}">
+  <ds:schemaRefs>
+    <ds:schemaRef ds:uri="http://schemas.microsoft.com/sharepoint/v3/contenttype/forms"/>
+  </ds:schemaRefs>
+</ds:datastoreItem>
+</file>
+
+<file path=customXml/itemProps3.xml><?xml version="1.0" encoding="utf-8"?>
+<ds:datastoreItem xmlns:ds="http://schemas.openxmlformats.org/officeDocument/2006/customXml" ds:itemID="{BBBBDC2F-23FD-461E-B3CB-F36D246E03EE}">
+  <ds:schemaRefs>
+    <ds:schemaRef ds:uri="http://purl.org/dc/elements/1.1/"/>
+    <ds:schemaRef ds:uri="http://www.w3.org/XML/1998/namespace"/>
+    <ds:schemaRef ds:uri="http://schemas.microsoft.com/office/2006/documentManagement/types"/>
+    <ds:schemaRef ds:uri="http://schemas.microsoft.com/office/2006/metadata/properties"/>
+    <ds:schemaRef ds:uri="http://purl.org/dc/dcmitype/"/>
+    <ds:schemaRef ds:uri="http://schemas.openxmlformats.org/package/2006/metadata/core-properties"/>
+    <ds:schemaRef ds:uri="http://schemas.microsoft.com/office/infopath/2007/PartnerControls"/>
+    <ds:schemaRef ds:uri="dc95a6b5-d2b4-4538-9df1-7a16f4196303"/>
+    <ds:schemaRef ds:uri="http://purl.org/dc/terms/"/>
+  </ds:schemaRefs>
+</ds:datastoreItem>
 </file>
</xml_diff>